<commit_message>
Update Presentation ASPNET - Part II.pptx
</commit_message>
<xml_diff>
--- a/Presentation ASPNET - Part II.pptx
+++ b/Presentation ASPNET - Part II.pptx
@@ -309,7 +309,7 @@
           <a:p>
             <a:fld id="{CD54E0B9-A397-428E-BA01-CD7A34B572EB}" type="datetimeFigureOut">
               <a:rPr lang="en-US" smtClean="0"/>
-              <a:t>5/23/2021</a:t>
+              <a:t>3/1/2025</a:t>
             </a:fld>
             <a:endParaRPr lang="en-US"/>
           </a:p>
@@ -474,7 +474,7 @@
           <a:p>
             <a:fld id="{AA161301-18C9-4CA0-A0BF-791B6E0DDD4D}" type="datetimeFigureOut">
               <a:rPr lang="en-GB" smtClean="0"/>
-              <a:t>23/05/2021</a:t>
+              <a:t>01/03/2025</a:t>
             </a:fld>
             <a:endParaRPr lang="en-GB"/>
           </a:p>
@@ -21507,13 +21507,13 @@
   <p:clrMapOvr>
     <a:masterClrMapping/>
   </p:clrMapOvr>
-  <mc:AlternateContent xmlns:mc="http://schemas.openxmlformats.org/markup-compatibility/2006">
-    <mc:Choice xmlns:p14="http://schemas.microsoft.com/office/powerpoint/2010/main" Requires="p14">
+  <mc:AlternateContent xmlns:mc="http://schemas.openxmlformats.org/markup-compatibility/2006" xmlns:p14="http://schemas.microsoft.com/office/powerpoint/2010/main">
+    <mc:Choice Requires="p14">
       <p:transition spd="med" p14:dur="700">
         <p:fade/>
       </p:transition>
     </mc:Choice>
-    <mc:Fallback>
+    <mc:Fallback xmlns="">
       <p:transition spd="med">
         <p:fade/>
       </p:transition>
@@ -22042,13 +22042,13 @@
   <p:clrMapOvr>
     <a:masterClrMapping/>
   </p:clrMapOvr>
-  <mc:AlternateContent xmlns:mc="http://schemas.openxmlformats.org/markup-compatibility/2006">
-    <mc:Choice xmlns:p14="http://schemas.microsoft.com/office/powerpoint/2010/main" Requires="p14">
+  <mc:AlternateContent xmlns:mc="http://schemas.openxmlformats.org/markup-compatibility/2006" xmlns:p14="http://schemas.microsoft.com/office/powerpoint/2010/main">
+    <mc:Choice Requires="p14">
       <p:transition spd="med" p14:dur="700">
         <p:fade/>
       </p:transition>
     </mc:Choice>
-    <mc:Fallback>
+    <mc:Fallback xmlns="">
       <p:transition spd="med">
         <p:fade/>
       </p:transition>
@@ -22371,12 +22371,12 @@
         </p:nvSpPr>
         <p:spPr>
           <a:xfrm>
-            <a:off x="767408" y="1340768"/>
-            <a:ext cx="6192688" cy="4813995"/>
+            <a:off x="767407" y="1340768"/>
+            <a:ext cx="7483507" cy="4813995"/>
           </a:xfrm>
         </p:spPr>
         <p:txBody>
-          <a:bodyPr/>
+          <a:bodyPr anchor="ctr"/>
           <a:lstStyle/>
           <a:p>
             <a:pPr marL="342900" indent="-342900">
@@ -22385,65 +22385,18 @@
             </a:pPr>
             <a:r>
               <a:rPr lang="en-US" b="1" dirty="0"/>
-              <a:t>ASP.NET Core Succinctly </a:t>
-            </a:r>
-            <a:r>
-              <a:rPr lang="en-US" b="1" dirty="0">
-                <a:solidFill>
-                  <a:schemeClr val="accent6"/>
-                </a:solidFill>
-              </a:rPr>
-              <a:t>(Free)</a:t>
-            </a:r>
-          </a:p>
-          <a:p>
-            <a:pPr marL="597150" lvl="1" indent="-342900" algn="just">
+              <a:t>Free Books:</a:t>
+            </a:r>
+          </a:p>
+          <a:p>
+            <a:pPr marL="597150" lvl="1" indent="-342900">
               <a:buFont typeface="Wingdings" panose="05000000000000000000" pitchFamily="2" charset="2"/>
               <a:buChar char="§"/>
             </a:pPr>
             <a:r>
-              <a:rPr lang="it-IT" dirty="0"/>
-              <a:t>Simone Chiaretta and Ugo Lattanzi</a:t>
-            </a:r>
-          </a:p>
-          <a:p>
-            <a:pPr marL="597150" lvl="1" indent="-342900" algn="just">
-              <a:buFont typeface="Wingdings" panose="05000000000000000000" pitchFamily="2" charset="2"/>
-              <a:buChar char="§"/>
-            </a:pPr>
-            <a:r>
               <a:rPr lang="en-US" dirty="0"/>
-              <a:t>In ASP.NET Core Succinctly, seasoned authors Simone </a:t>
-            </a:r>
-            <a:r>
-              <a:rPr lang="en-US" dirty="0" err="1"/>
-              <a:t>Chiaretta</a:t>
-            </a:r>
-            <a:r>
-              <a:rPr lang="en-US" dirty="0"/>
-              <a:t> and Ugo </a:t>
-            </a:r>
-            <a:r>
-              <a:rPr lang="en-US" dirty="0" err="1"/>
-              <a:t>Lattanzi</a:t>
-            </a:r>
-            <a:r>
-              <a:rPr lang="en-US" dirty="0"/>
-              <a:t> update you on all the advances provided by Microsoft’s landmark framework.</a:t>
-            </a:r>
-          </a:p>
-          <a:p>
-            <a:pPr marL="597150" lvl="1" indent="-342900" algn="just">
-              <a:buFont typeface="Wingdings" panose="05000000000000000000" pitchFamily="2" charset="2"/>
-              <a:buChar char="§"/>
-            </a:pPr>
-            <a:r>
-              <a:rPr lang="en-US" dirty="0">
-                <a:hlinkClick r:id="rId2"/>
-              </a:rPr>
-              <a:t>https://www.syncfusion.com/resources/techportal/details/ebooks/ASP_NET_Core_Succinctly</a:t>
-            </a:r>
-            <a:endParaRPr lang="en-US" dirty="0"/>
+              <a:t>https://www.syncfusion.com/succinctly-free-ebooks?category=all&amp;searchkey=asp.net&amp;type=all</a:t>
+            </a:r>
           </a:p>
         </p:txBody>
       </p:sp>
@@ -22469,66 +22422,118 @@
           </a:p>
         </p:txBody>
       </p:sp>
-      <p:pic>
-        <p:nvPicPr>
-          <p:cNvPr id="6" name="Picture 5" descr="A picture containing text&#10;&#10;Description generated with high confidence"/>
-          <p:cNvPicPr>
-            <a:picLocks noChangeAspect="1"/>
-          </p:cNvPicPr>
-          <p:nvPr/>
-        </p:nvPicPr>
-        <p:blipFill>
-          <a:blip r:embed="rId3" cstate="print">
+      <p:grpSp>
+        <p:nvGrpSpPr>
+          <p:cNvPr id="10" name="Group 9">
             <a:extLst>
-              <a:ext uri="{28A0092B-C50C-407E-A947-70E740481C1C}">
-                <a14:useLocalDpi xmlns:a14="http://schemas.microsoft.com/office/drawing/2010/main" val="0"/>
+              <a:ext uri="{FF2B5EF4-FFF2-40B4-BE49-F238E27FC236}">
+                <a16:creationId xmlns:a16="http://schemas.microsoft.com/office/drawing/2014/main" id="{79F304C5-FC81-A5E8-3118-FA6ECA3ADE07}"/>
               </a:ext>
             </a:extLst>
-          </a:blip>
-          <a:stretch>
-            <a:fillRect/>
-          </a:stretch>
-        </p:blipFill>
-        <p:spPr>
+          </p:cNvPr>
+          <p:cNvGrpSpPr/>
+          <p:nvPr/>
+        </p:nvGrpSpPr>
+        <p:grpSpPr>
           <a:xfrm>
-            <a:off x="8328248" y="1340768"/>
-            <a:ext cx="2976364" cy="4251949"/>
+            <a:off x="8544272" y="3140968"/>
+            <a:ext cx="2592288" cy="1224136"/>
+            <a:chOff x="8544272" y="3063128"/>
+            <a:chExt cx="2592288" cy="1224136"/>
           </a:xfrm>
-          <a:prstGeom prst="rect">
-            <a:avLst/>
-          </a:prstGeom>
-        </p:spPr>
-      </p:pic>
-      <p:pic>
-        <p:nvPicPr>
-          <p:cNvPr id="8" name="Picture 7" descr="A picture containing screenshot&#10;&#10;Description generated with high confidence"/>
-          <p:cNvPicPr>
-            <a:picLocks noChangeAspect="1"/>
-          </p:cNvPicPr>
-          <p:nvPr/>
-        </p:nvPicPr>
-        <p:blipFill>
-          <a:blip r:embed="rId4">
-            <a:extLst>
-              <a:ext uri="{28A0092B-C50C-407E-A947-70E740481C1C}">
-                <a14:useLocalDpi xmlns:a14="http://schemas.microsoft.com/office/drawing/2010/main" val="0"/>
-              </a:ext>
-            </a:extLst>
-          </a:blip>
-          <a:stretch>
-            <a:fillRect/>
-          </a:stretch>
-        </p:blipFill>
-        <p:spPr>
-          <a:xfrm>
-            <a:off x="8328248" y="1340768"/>
-            <a:ext cx="3178332" cy="4251949"/>
-          </a:xfrm>
-          <a:prstGeom prst="rect">
-            <a:avLst/>
-          </a:prstGeom>
-        </p:spPr>
-      </p:pic>
+        </p:grpSpPr>
+        <p:sp>
+          <p:nvSpPr>
+            <p:cNvPr id="9" name="Rectangle 8">
+              <a:extLst>
+                <a:ext uri="{FF2B5EF4-FFF2-40B4-BE49-F238E27FC236}">
+                  <a16:creationId xmlns:a16="http://schemas.microsoft.com/office/drawing/2014/main" id="{69C07AB8-D684-B311-90A0-A621070B7117}"/>
+                </a:ext>
+              </a:extLst>
+            </p:cNvPr>
+            <p:cNvSpPr/>
+            <p:nvPr/>
+          </p:nvSpPr>
+          <p:spPr>
+            <a:xfrm>
+              <a:off x="8544272" y="3063128"/>
+              <a:ext cx="2592288" cy="1224136"/>
+            </a:xfrm>
+            <a:prstGeom prst="rect">
+              <a:avLst/>
+            </a:prstGeom>
+            <a:solidFill>
+              <a:schemeClr val="tx1">
+                <a:lumMod val="50000"/>
+                <a:lumOff val="50000"/>
+              </a:schemeClr>
+            </a:solidFill>
+            <a:ln>
+              <a:noFill/>
+            </a:ln>
+          </p:spPr>
+          <p:style>
+            <a:lnRef idx="2">
+              <a:schemeClr val="accent1">
+                <a:shade val="15000"/>
+              </a:schemeClr>
+            </a:lnRef>
+            <a:fillRef idx="1">
+              <a:schemeClr val="accent1"/>
+            </a:fillRef>
+            <a:effectRef idx="0">
+              <a:schemeClr val="accent1"/>
+            </a:effectRef>
+            <a:fontRef idx="minor">
+              <a:schemeClr val="lt1"/>
+            </a:fontRef>
+          </p:style>
+          <p:txBody>
+            <a:bodyPr rtlCol="0" anchor="ctr"/>
+            <a:lstStyle/>
+            <a:p>
+              <a:pPr algn="ctr"/>
+              <a:endParaRPr lang="ro-RO"/>
+            </a:p>
+          </p:txBody>
+        </p:sp>
+        <p:pic>
+          <p:nvPicPr>
+            <p:cNvPr id="7" name="Picture 6" descr="A white text on a black background&#10;&#10;AI-generated content may be incorrect.">
+              <a:extLst>
+                <a:ext uri="{FF2B5EF4-FFF2-40B4-BE49-F238E27FC236}">
+                  <a16:creationId xmlns:a16="http://schemas.microsoft.com/office/drawing/2014/main" id="{042BDC53-E404-0BDF-0F3B-6A7173D8CB5C}"/>
+                </a:ext>
+              </a:extLst>
+            </p:cNvPr>
+            <p:cNvPicPr>
+              <a:picLocks noChangeAspect="1"/>
+            </p:cNvPicPr>
+            <p:nvPr/>
+          </p:nvPicPr>
+          <p:blipFill>
+            <a:blip r:embed="rId2">
+              <a:extLst>
+                <a:ext uri="{28A0092B-C50C-407E-A947-70E740481C1C}">
+                  <a14:useLocalDpi xmlns:a14="http://schemas.microsoft.com/office/drawing/2010/main" val="0"/>
+                </a:ext>
+              </a:extLst>
+            </a:blip>
+            <a:stretch>
+              <a:fillRect/>
+            </a:stretch>
+          </p:blipFill>
+          <p:spPr>
+            <a:xfrm>
+              <a:off x="8837629" y="3475833"/>
+              <a:ext cx="2082907" cy="457223"/>
+            </a:xfrm>
+            <a:prstGeom prst="rect">
+              <a:avLst/>
+            </a:prstGeom>
+          </p:spPr>
+        </p:pic>
+      </p:grpSp>
     </p:spTree>
     <p:extLst>
       <p:ext uri="{BB962C8B-B14F-4D97-AF65-F5344CB8AC3E}">

</xml_diff>